<commit_message>
Update with rep 6 data and analysis done.
</commit_message>
<xml_diff>
--- a/females/network_figs.pptx
+++ b/females/network_figs.pptx
@@ -8,6 +8,12 @@
     <p:sldId id="259" r:id="rId2"/>
     <p:sldId id="257" r:id="rId3"/>
     <p:sldId id="258" r:id="rId4"/>
+    <p:sldId id="260" r:id="rId5"/>
+    <p:sldId id="261" r:id="rId6"/>
+    <p:sldId id="262" r:id="rId7"/>
+    <p:sldId id="263" r:id="rId8"/>
+    <p:sldId id="264" r:id="rId9"/>
+    <p:sldId id="265" r:id="rId10"/>
   </p:sldIdLst>
   <p:sldSz cx="12192000" cy="6858000"/>
   <p:notesSz cx="6858000" cy="9144000"/>
@@ -106,6 +112,11 @@
       </a:defRPr>
     </a:lvl9pPr>
   </p:defaultTextStyle>
+  <p:extLst>
+    <p:ext uri="{EFAFB233-063F-42B5-8137-9DF3F51BA10A}">
+      <p15:sldGuideLst xmlns:p15="http://schemas.microsoft.com/office/powerpoint/2012/main"/>
+    </p:ext>
+  </p:extLst>
 </p:presentation>
 </file>
 
@@ -258,7 +269,7 @@
           <a:p>
             <a:fld id="{37FE9F70-C9F8-45D4-AA0A-BC12C5F64038}" type="datetimeFigureOut">
               <a:rPr lang="en-CA" smtClean="0"/>
-              <a:t>2023-02-13</a:t>
+              <a:t>2023-03-12</a:t>
             </a:fld>
             <a:endParaRPr lang="en-CA"/>
           </a:p>
@@ -458,7 +469,7 @@
           <a:p>
             <a:fld id="{37FE9F70-C9F8-45D4-AA0A-BC12C5F64038}" type="datetimeFigureOut">
               <a:rPr lang="en-CA" smtClean="0"/>
-              <a:t>2023-02-13</a:t>
+              <a:t>2023-03-12</a:t>
             </a:fld>
             <a:endParaRPr lang="en-CA"/>
           </a:p>
@@ -668,7 +679,7 @@
           <a:p>
             <a:fld id="{37FE9F70-C9F8-45D4-AA0A-BC12C5F64038}" type="datetimeFigureOut">
               <a:rPr lang="en-CA" smtClean="0"/>
-              <a:t>2023-02-13</a:t>
+              <a:t>2023-03-12</a:t>
             </a:fld>
             <a:endParaRPr lang="en-CA"/>
           </a:p>
@@ -868,7 +879,7 @@
           <a:p>
             <a:fld id="{37FE9F70-C9F8-45D4-AA0A-BC12C5F64038}" type="datetimeFigureOut">
               <a:rPr lang="en-CA" smtClean="0"/>
-              <a:t>2023-02-13</a:t>
+              <a:t>2023-03-12</a:t>
             </a:fld>
             <a:endParaRPr lang="en-CA"/>
           </a:p>
@@ -1144,7 +1155,7 @@
           <a:p>
             <a:fld id="{37FE9F70-C9F8-45D4-AA0A-BC12C5F64038}" type="datetimeFigureOut">
               <a:rPr lang="en-CA" smtClean="0"/>
-              <a:t>2023-02-13</a:t>
+              <a:t>2023-03-12</a:t>
             </a:fld>
             <a:endParaRPr lang="en-CA"/>
           </a:p>
@@ -1412,7 +1423,7 @@
           <a:p>
             <a:fld id="{37FE9F70-C9F8-45D4-AA0A-BC12C5F64038}" type="datetimeFigureOut">
               <a:rPr lang="en-CA" smtClean="0"/>
-              <a:t>2023-02-13</a:t>
+              <a:t>2023-03-12</a:t>
             </a:fld>
             <a:endParaRPr lang="en-CA"/>
           </a:p>
@@ -1827,7 +1838,7 @@
           <a:p>
             <a:fld id="{37FE9F70-C9F8-45D4-AA0A-BC12C5F64038}" type="datetimeFigureOut">
               <a:rPr lang="en-CA" smtClean="0"/>
-              <a:t>2023-02-13</a:t>
+              <a:t>2023-03-12</a:t>
             </a:fld>
             <a:endParaRPr lang="en-CA"/>
           </a:p>
@@ -1969,7 +1980,7 @@
           <a:p>
             <a:fld id="{37FE9F70-C9F8-45D4-AA0A-BC12C5F64038}" type="datetimeFigureOut">
               <a:rPr lang="en-CA" smtClean="0"/>
-              <a:t>2023-02-13</a:t>
+              <a:t>2023-03-12</a:t>
             </a:fld>
             <a:endParaRPr lang="en-CA"/>
           </a:p>
@@ -2082,7 +2093,7 @@
           <a:p>
             <a:fld id="{37FE9F70-C9F8-45D4-AA0A-BC12C5F64038}" type="datetimeFigureOut">
               <a:rPr lang="en-CA" smtClean="0"/>
-              <a:t>2023-02-13</a:t>
+              <a:t>2023-03-12</a:t>
             </a:fld>
             <a:endParaRPr lang="en-CA"/>
           </a:p>
@@ -2395,7 +2406,7 @@
           <a:p>
             <a:fld id="{37FE9F70-C9F8-45D4-AA0A-BC12C5F64038}" type="datetimeFigureOut">
               <a:rPr lang="en-CA" smtClean="0"/>
-              <a:t>2023-02-13</a:t>
+              <a:t>2023-03-12</a:t>
             </a:fld>
             <a:endParaRPr lang="en-CA"/>
           </a:p>
@@ -2684,7 +2695,7 @@
           <a:p>
             <a:fld id="{37FE9F70-C9F8-45D4-AA0A-BC12C5F64038}" type="datetimeFigureOut">
               <a:rPr lang="en-CA" smtClean="0"/>
-              <a:t>2023-02-13</a:t>
+              <a:t>2023-03-12</a:t>
             </a:fld>
             <a:endParaRPr lang="en-CA"/>
           </a:p>
@@ -2927,7 +2938,7 @@
           <a:p>
             <a:fld id="{37FE9F70-C9F8-45D4-AA0A-BC12C5F64038}" type="datetimeFigureOut">
               <a:rPr lang="en-CA" smtClean="0"/>
-              <a:t>2023-02-13</a:t>
+              <a:t>2023-03-12</a:t>
             </a:fld>
             <a:endParaRPr lang="en-CA"/>
           </a:p>
@@ -3346,10 +3357,10 @@
       </p:grpSpPr>
       <p:pic>
         <p:nvPicPr>
-          <p:cNvPr id="3" name="Picture 2">
-            <a:extLst>
-              <a:ext uri="{FF2B5EF4-FFF2-40B4-BE49-F238E27FC236}">
-                <a16:creationId xmlns:a16="http://schemas.microsoft.com/office/drawing/2014/main" id="{5A5419AC-FCE3-9A48-BA0A-C16F2965D8ED}"/>
+          <p:cNvPr id="10" name="Picture 9">
+            <a:extLst>
+              <a:ext uri="{FF2B5EF4-FFF2-40B4-BE49-F238E27FC236}">
+                <a16:creationId xmlns:a16="http://schemas.microsoft.com/office/drawing/2014/main" id="{C0477512-F208-5545-8A84-9A2DB0F9BB87}"/>
               </a:ext>
             </a:extLst>
           </p:cNvPr>
@@ -3366,8 +3377,8 @@
         </p:blipFill>
         <p:spPr>
           <a:xfrm>
-            <a:off x="268880" y="620265"/>
-            <a:ext cx="5702711" cy="5617469"/>
+            <a:off x="164592" y="686753"/>
+            <a:ext cx="5931407" cy="5749569"/>
           </a:xfrm>
           <a:prstGeom prst="rect">
             <a:avLst/>
@@ -3426,7 +3437,7 @@
         </p:nvGrpSpPr>
         <p:grpSpPr>
           <a:xfrm>
-            <a:off x="4239208" y="4298012"/>
+            <a:off x="4389120" y="4932805"/>
             <a:ext cx="3017520" cy="1238442"/>
             <a:chOff x="7324344" y="2809779"/>
             <a:chExt cx="3017520" cy="1238442"/>
@@ -3711,8 +3722,8 @@
         </p:blipFill>
         <p:spPr>
           <a:xfrm>
-            <a:off x="364240" y="705147"/>
-            <a:ext cx="5430008" cy="5134692"/>
+            <a:off x="364240" y="705146"/>
+            <a:ext cx="5607426" cy="5302461"/>
           </a:xfrm>
           <a:prstGeom prst="rect">
             <a:avLst/>
@@ -4321,10 +4332,10 @@
       </p:grpSp>
       <p:pic>
         <p:nvPicPr>
-          <p:cNvPr id="9" name="Picture 8">
-            <a:extLst>
-              <a:ext uri="{FF2B5EF4-FFF2-40B4-BE49-F238E27FC236}">
-                <a16:creationId xmlns:a16="http://schemas.microsoft.com/office/drawing/2014/main" id="{33C76594-652D-E375-2129-EB8DD57B9C3A}"/>
+          <p:cNvPr id="10" name="Picture 9">
+            <a:extLst>
+              <a:ext uri="{FF2B5EF4-FFF2-40B4-BE49-F238E27FC236}">
+                <a16:creationId xmlns:a16="http://schemas.microsoft.com/office/drawing/2014/main" id="{F663BA9A-3FAB-547C-7B08-304D6F55E11D}"/>
               </a:ext>
             </a:extLst>
           </p:cNvPr>
@@ -4341,8 +4352,8 @@
         </p:blipFill>
         <p:spPr>
           <a:xfrm>
-            <a:off x="164592" y="721860"/>
-            <a:ext cx="5148072" cy="5645718"/>
+            <a:off x="1" y="684013"/>
+            <a:ext cx="5602774" cy="5506476"/>
           </a:xfrm>
           <a:prstGeom prst="rect">
             <a:avLst/>
@@ -4353,6 +4364,1467 @@
     <p:extLst>
       <p:ext uri="{BB962C8B-B14F-4D97-AF65-F5344CB8AC3E}">
         <p14:creationId xmlns:p14="http://schemas.microsoft.com/office/powerpoint/2010/main" val="1055282239"/>
+      </p:ext>
+    </p:extLst>
+  </p:cSld>
+  <p:clrMapOvr>
+    <a:masterClrMapping/>
+  </p:clrMapOvr>
+</p:sld>
+</file>
+
+<file path=ppt/slides/slide4.xml><?xml version="1.0" encoding="utf-8"?>
+<p:sld xmlns:a="http://schemas.openxmlformats.org/drawingml/2006/main" xmlns:r="http://schemas.openxmlformats.org/officeDocument/2006/relationships" xmlns:p="http://schemas.openxmlformats.org/presentationml/2006/main">
+  <p:cSld>
+    <p:spTree>
+      <p:nvGrpSpPr>
+        <p:cNvPr id="1" name=""/>
+        <p:cNvGrpSpPr/>
+        <p:nvPr/>
+      </p:nvGrpSpPr>
+      <p:grpSpPr>
+        <a:xfrm>
+          <a:off x="0" y="0"/>
+          <a:ext cx="0" cy="0"/>
+          <a:chOff x="0" y="0"/>
+          <a:chExt cx="0" cy="0"/>
+        </a:xfrm>
+      </p:grpSpPr>
+      <p:pic>
+        <p:nvPicPr>
+          <p:cNvPr id="9" name="Picture 8">
+            <a:extLst>
+              <a:ext uri="{FF2B5EF4-FFF2-40B4-BE49-F238E27FC236}">
+                <a16:creationId xmlns:a16="http://schemas.microsoft.com/office/drawing/2014/main" id="{941D2FC9-0404-B6F1-90C5-5A01F65FAE73}"/>
+              </a:ext>
+            </a:extLst>
+          </p:cNvPr>
+          <p:cNvPicPr>
+            <a:picLocks noChangeAspect="1"/>
+          </p:cNvPicPr>
+          <p:nvPr/>
+        </p:nvPicPr>
+        <p:blipFill>
+          <a:blip r:embed="rId2"/>
+          <a:stretch>
+            <a:fillRect/>
+          </a:stretch>
+        </p:blipFill>
+        <p:spPr>
+          <a:xfrm>
+            <a:off x="142732" y="705147"/>
+            <a:ext cx="5834396" cy="5970926"/>
+          </a:xfrm>
+          <a:prstGeom prst="rect">
+            <a:avLst/>
+          </a:prstGeom>
+        </p:spPr>
+      </p:pic>
+      <p:sp>
+        <p:nvSpPr>
+          <p:cNvPr id="2" name="TextBox 1">
+            <a:extLst>
+              <a:ext uri="{FF2B5EF4-FFF2-40B4-BE49-F238E27FC236}">
+                <a16:creationId xmlns:a16="http://schemas.microsoft.com/office/drawing/2014/main" id="{B0EC832F-E7B9-522E-8E01-2F7E74EC4644}"/>
+              </a:ext>
+            </a:extLst>
+          </p:cNvPr>
+          <p:cNvSpPr txBox="1"/>
+          <p:nvPr/>
+        </p:nvSpPr>
+        <p:spPr>
+          <a:xfrm>
+            <a:off x="164592" y="181927"/>
+            <a:ext cx="7242048" cy="523220"/>
+          </a:xfrm>
+          <a:prstGeom prst="rect">
+            <a:avLst/>
+          </a:prstGeom>
+          <a:noFill/>
+        </p:spPr>
+        <p:txBody>
+          <a:bodyPr wrap="square" rtlCol="0">
+            <a:spAutoFit/>
+          </a:bodyPr>
+          <a:lstStyle/>
+          <a:p>
+            <a:r>
+              <a:rPr lang="en-CA" sz="2800" b="1" dirty="0">
+                <a:latin typeface="Helvetica" panose="020B0604020202020204" pitchFamily="34" charset="0"/>
+                <a:cs typeface="Helvetica" panose="020B0604020202020204" pitchFamily="34" charset="0"/>
+              </a:rPr>
+              <a:t>Replicate 4: Insemination network</a:t>
+            </a:r>
+          </a:p>
+        </p:txBody>
+      </p:sp>
+      <p:grpSp>
+        <p:nvGrpSpPr>
+          <p:cNvPr id="3" name="Group 2">
+            <a:extLst>
+              <a:ext uri="{FF2B5EF4-FFF2-40B4-BE49-F238E27FC236}">
+                <a16:creationId xmlns:a16="http://schemas.microsoft.com/office/drawing/2014/main" id="{99A03756-927D-C0CD-951A-03C60AA7917A}"/>
+              </a:ext>
+            </a:extLst>
+          </p:cNvPr>
+          <p:cNvGrpSpPr/>
+          <p:nvPr/>
+        </p:nvGrpSpPr>
+        <p:grpSpPr>
+          <a:xfrm>
+            <a:off x="5711952" y="4256543"/>
+            <a:ext cx="3017520" cy="1238442"/>
+            <a:chOff x="7324344" y="2809779"/>
+            <a:chExt cx="3017520" cy="1238442"/>
+          </a:xfrm>
+        </p:grpSpPr>
+        <p:sp>
+          <p:nvSpPr>
+            <p:cNvPr id="4" name="TextBox 3">
+              <a:extLst>
+                <a:ext uri="{FF2B5EF4-FFF2-40B4-BE49-F238E27FC236}">
+                  <a16:creationId xmlns:a16="http://schemas.microsoft.com/office/drawing/2014/main" id="{3D4247D0-0354-3D53-B68B-45645897CBC1}"/>
+                </a:ext>
+              </a:extLst>
+            </p:cNvPr>
+            <p:cNvSpPr txBox="1"/>
+            <p:nvPr/>
+          </p:nvSpPr>
+          <p:spPr>
+            <a:xfrm>
+              <a:off x="7571232" y="2809779"/>
+              <a:ext cx="2770632" cy="1238442"/>
+            </a:xfrm>
+            <a:prstGeom prst="rect">
+              <a:avLst/>
+            </a:prstGeom>
+            <a:noFill/>
+          </p:spPr>
+          <p:txBody>
+            <a:bodyPr wrap="square" rtlCol="0">
+              <a:spAutoFit/>
+            </a:bodyPr>
+            <a:lstStyle/>
+            <a:p>
+              <a:r>
+                <a:rPr lang="en-CA" sz="2400" b="1" dirty="0">
+                  <a:latin typeface="Helvetica" panose="020B0604020202020204" pitchFamily="34" charset="0"/>
+                  <a:cs typeface="Helvetica" panose="020B0604020202020204" pitchFamily="34" charset="0"/>
+                </a:rPr>
+                <a:t>Isolated female</a:t>
+              </a:r>
+              <a:br>
+                <a:rPr lang="en-CA" sz="2400" b="1" dirty="0">
+                  <a:latin typeface="Helvetica" panose="020B0604020202020204" pitchFamily="34" charset="0"/>
+                  <a:cs typeface="Helvetica" panose="020B0604020202020204" pitchFamily="34" charset="0"/>
+                </a:rPr>
+              </a:br>
+              <a:r>
+                <a:rPr lang="en-CA" sz="2400" b="1" dirty="0">
+                  <a:latin typeface="Helvetica" panose="020B0604020202020204" pitchFamily="34" charset="0"/>
+                  <a:cs typeface="Helvetica" panose="020B0604020202020204" pitchFamily="34" charset="0"/>
+                </a:rPr>
+                <a:t>Social female</a:t>
+              </a:r>
+              <a:br>
+                <a:rPr lang="en-CA" sz="2400" b="1" dirty="0">
+                  <a:latin typeface="Helvetica" panose="020B0604020202020204" pitchFamily="34" charset="0"/>
+                  <a:cs typeface="Helvetica" panose="020B0604020202020204" pitchFamily="34" charset="0"/>
+                </a:rPr>
+              </a:br>
+              <a:r>
+                <a:rPr lang="en-CA" sz="2400" b="1" dirty="0">
+                  <a:latin typeface="Helvetica" panose="020B0604020202020204" pitchFamily="34" charset="0"/>
+                  <a:cs typeface="Helvetica" panose="020B0604020202020204" pitchFamily="34" charset="0"/>
+                </a:rPr>
+                <a:t>Male</a:t>
+              </a:r>
+            </a:p>
+          </p:txBody>
+        </p:sp>
+        <p:sp>
+          <p:nvSpPr>
+            <p:cNvPr id="5" name="Oval 4">
+              <a:extLst>
+                <a:ext uri="{FF2B5EF4-FFF2-40B4-BE49-F238E27FC236}">
+                  <a16:creationId xmlns:a16="http://schemas.microsoft.com/office/drawing/2014/main" id="{77CC7CF5-402B-2F68-0CFB-F40E93B4F6FC}"/>
+                </a:ext>
+              </a:extLst>
+            </p:cNvPr>
+            <p:cNvSpPr/>
+            <p:nvPr/>
+          </p:nvSpPr>
+          <p:spPr>
+            <a:xfrm>
+              <a:off x="7324344" y="2922794"/>
+              <a:ext cx="265176" cy="256032"/>
+            </a:xfrm>
+            <a:prstGeom prst="ellipse">
+              <a:avLst/>
+            </a:prstGeom>
+            <a:solidFill>
+              <a:srgbClr val="F6BD60"/>
+            </a:solidFill>
+            <a:ln>
+              <a:solidFill>
+                <a:schemeClr val="tx1"/>
+              </a:solidFill>
+            </a:ln>
+          </p:spPr>
+          <p:style>
+            <a:lnRef idx="2">
+              <a:schemeClr val="accent1">
+                <a:shade val="50000"/>
+              </a:schemeClr>
+            </a:lnRef>
+            <a:fillRef idx="1">
+              <a:schemeClr val="accent1"/>
+            </a:fillRef>
+            <a:effectRef idx="0">
+              <a:schemeClr val="accent1"/>
+            </a:effectRef>
+            <a:fontRef idx="minor">
+              <a:schemeClr val="lt1"/>
+            </a:fontRef>
+          </p:style>
+          <p:txBody>
+            <a:bodyPr rtlCol="0" anchor="ctr"/>
+            <a:lstStyle/>
+            <a:p>
+              <a:pPr algn="ctr"/>
+              <a:endParaRPr lang="en-CA"/>
+            </a:p>
+          </p:txBody>
+        </p:sp>
+        <p:sp>
+          <p:nvSpPr>
+            <p:cNvPr id="6" name="Oval 5">
+              <a:extLst>
+                <a:ext uri="{FF2B5EF4-FFF2-40B4-BE49-F238E27FC236}">
+                  <a16:creationId xmlns:a16="http://schemas.microsoft.com/office/drawing/2014/main" id="{E49520D5-4CED-9D48-640D-2D7DE8A359B5}"/>
+                </a:ext>
+              </a:extLst>
+            </p:cNvPr>
+            <p:cNvSpPr/>
+            <p:nvPr/>
+          </p:nvSpPr>
+          <p:spPr>
+            <a:xfrm>
+              <a:off x="7324344" y="3291841"/>
+              <a:ext cx="265176" cy="256032"/>
+            </a:xfrm>
+            <a:prstGeom prst="ellipse">
+              <a:avLst/>
+            </a:prstGeom>
+            <a:solidFill>
+              <a:srgbClr val="F77F00"/>
+            </a:solidFill>
+            <a:ln>
+              <a:solidFill>
+                <a:schemeClr val="tx1"/>
+              </a:solidFill>
+            </a:ln>
+          </p:spPr>
+          <p:style>
+            <a:lnRef idx="2">
+              <a:schemeClr val="accent1">
+                <a:shade val="50000"/>
+              </a:schemeClr>
+            </a:lnRef>
+            <a:fillRef idx="1">
+              <a:schemeClr val="accent1"/>
+            </a:fillRef>
+            <a:effectRef idx="0">
+              <a:schemeClr val="accent1"/>
+            </a:effectRef>
+            <a:fontRef idx="minor">
+              <a:schemeClr val="lt1"/>
+            </a:fontRef>
+          </p:style>
+          <p:txBody>
+            <a:bodyPr rtlCol="0" anchor="ctr"/>
+            <a:lstStyle/>
+            <a:p>
+              <a:pPr algn="ctr"/>
+              <a:endParaRPr lang="en-CA"/>
+            </a:p>
+          </p:txBody>
+        </p:sp>
+        <p:sp>
+          <p:nvSpPr>
+            <p:cNvPr id="7" name="Oval 6">
+              <a:extLst>
+                <a:ext uri="{FF2B5EF4-FFF2-40B4-BE49-F238E27FC236}">
+                  <a16:creationId xmlns:a16="http://schemas.microsoft.com/office/drawing/2014/main" id="{12087923-2A3D-5AB3-DB1E-8B9EDC68C689}"/>
+                </a:ext>
+              </a:extLst>
+            </p:cNvPr>
+            <p:cNvSpPr/>
+            <p:nvPr/>
+          </p:nvSpPr>
+          <p:spPr>
+            <a:xfrm>
+              <a:off x="7324344" y="3660888"/>
+              <a:ext cx="265176" cy="256032"/>
+            </a:xfrm>
+            <a:prstGeom prst="ellipse">
+              <a:avLst/>
+            </a:prstGeom>
+            <a:solidFill>
+              <a:srgbClr val="108AB2"/>
+            </a:solidFill>
+            <a:ln>
+              <a:solidFill>
+                <a:schemeClr val="tx1"/>
+              </a:solidFill>
+            </a:ln>
+          </p:spPr>
+          <p:style>
+            <a:lnRef idx="2">
+              <a:schemeClr val="accent1">
+                <a:shade val="50000"/>
+              </a:schemeClr>
+            </a:lnRef>
+            <a:fillRef idx="1">
+              <a:schemeClr val="accent1"/>
+            </a:fillRef>
+            <a:effectRef idx="0">
+              <a:schemeClr val="accent1"/>
+            </a:effectRef>
+            <a:fontRef idx="minor">
+              <a:schemeClr val="lt1"/>
+            </a:fontRef>
+          </p:style>
+          <p:txBody>
+            <a:bodyPr rtlCol="0" anchor="ctr"/>
+            <a:lstStyle/>
+            <a:p>
+              <a:pPr algn="ctr"/>
+              <a:endParaRPr lang="en-CA" dirty="0"/>
+            </a:p>
+          </p:txBody>
+        </p:sp>
+      </p:grpSp>
+    </p:spTree>
+    <p:extLst>
+      <p:ext uri="{BB962C8B-B14F-4D97-AF65-F5344CB8AC3E}">
+        <p14:creationId xmlns:p14="http://schemas.microsoft.com/office/powerpoint/2010/main" val="200648265"/>
+      </p:ext>
+    </p:extLst>
+  </p:cSld>
+  <p:clrMapOvr>
+    <a:masterClrMapping/>
+  </p:clrMapOvr>
+</p:sld>
+</file>
+
+<file path=ppt/slides/slide5.xml><?xml version="1.0" encoding="utf-8"?>
+<p:sld xmlns:a="http://schemas.openxmlformats.org/drawingml/2006/main" xmlns:r="http://schemas.openxmlformats.org/officeDocument/2006/relationships" xmlns:p="http://schemas.openxmlformats.org/presentationml/2006/main">
+  <p:cSld>
+    <p:spTree>
+      <p:nvGrpSpPr>
+        <p:cNvPr id="1" name=""/>
+        <p:cNvGrpSpPr/>
+        <p:nvPr/>
+      </p:nvGrpSpPr>
+      <p:grpSpPr>
+        <a:xfrm>
+          <a:off x="0" y="0"/>
+          <a:ext cx="0" cy="0"/>
+          <a:chOff x="0" y="0"/>
+          <a:chExt cx="0" cy="0"/>
+        </a:xfrm>
+      </p:grpSpPr>
+      <p:pic>
+        <p:nvPicPr>
+          <p:cNvPr id="3" name="Picture 2">
+            <a:extLst>
+              <a:ext uri="{FF2B5EF4-FFF2-40B4-BE49-F238E27FC236}">
+                <a16:creationId xmlns:a16="http://schemas.microsoft.com/office/drawing/2014/main" id="{A6FAE989-0750-ED93-DD00-529C22FF1A86}"/>
+              </a:ext>
+            </a:extLst>
+          </p:cNvPr>
+          <p:cNvPicPr>
+            <a:picLocks noChangeAspect="1"/>
+          </p:cNvPicPr>
+          <p:nvPr/>
+        </p:nvPicPr>
+        <p:blipFill>
+          <a:blip r:embed="rId2"/>
+          <a:stretch>
+            <a:fillRect/>
+          </a:stretch>
+        </p:blipFill>
+        <p:spPr>
+          <a:xfrm>
+            <a:off x="350017" y="993032"/>
+            <a:ext cx="5845510" cy="5686391"/>
+          </a:xfrm>
+          <a:prstGeom prst="rect">
+            <a:avLst/>
+          </a:prstGeom>
+        </p:spPr>
+      </p:pic>
+      <p:sp>
+        <p:nvSpPr>
+          <p:cNvPr id="4" name="TextBox 3">
+            <a:extLst>
+              <a:ext uri="{FF2B5EF4-FFF2-40B4-BE49-F238E27FC236}">
+                <a16:creationId xmlns:a16="http://schemas.microsoft.com/office/drawing/2014/main" id="{A9273956-D752-F5CC-6DAF-7CB89FA87092}"/>
+              </a:ext>
+            </a:extLst>
+          </p:cNvPr>
+          <p:cNvSpPr txBox="1"/>
+          <p:nvPr/>
+        </p:nvSpPr>
+        <p:spPr>
+          <a:xfrm>
+            <a:off x="164592" y="181927"/>
+            <a:ext cx="7242048" cy="523220"/>
+          </a:xfrm>
+          <a:prstGeom prst="rect">
+            <a:avLst/>
+          </a:prstGeom>
+          <a:noFill/>
+        </p:spPr>
+        <p:txBody>
+          <a:bodyPr wrap="square" rtlCol="0">
+            <a:spAutoFit/>
+          </a:bodyPr>
+          <a:lstStyle/>
+          <a:p>
+            <a:r>
+              <a:rPr lang="en-CA" sz="2800" b="1" dirty="0">
+                <a:latin typeface="Helvetica" panose="020B0604020202020204" pitchFamily="34" charset="0"/>
+                <a:cs typeface="Helvetica" panose="020B0604020202020204" pitchFamily="34" charset="0"/>
+              </a:rPr>
+              <a:t>Replicate 5: Insemination network</a:t>
+            </a:r>
+          </a:p>
+        </p:txBody>
+      </p:sp>
+      <p:grpSp>
+        <p:nvGrpSpPr>
+          <p:cNvPr id="5" name="Group 4">
+            <a:extLst>
+              <a:ext uri="{FF2B5EF4-FFF2-40B4-BE49-F238E27FC236}">
+                <a16:creationId xmlns:a16="http://schemas.microsoft.com/office/drawing/2014/main" id="{9DCAD885-626D-3893-C3E2-BB6382C0F19E}"/>
+              </a:ext>
+            </a:extLst>
+          </p:cNvPr>
+          <p:cNvGrpSpPr/>
+          <p:nvPr/>
+        </p:nvGrpSpPr>
+        <p:grpSpPr>
+          <a:xfrm>
+            <a:off x="5711952" y="4256543"/>
+            <a:ext cx="3017520" cy="1238442"/>
+            <a:chOff x="7324344" y="2809779"/>
+            <a:chExt cx="3017520" cy="1238442"/>
+          </a:xfrm>
+        </p:grpSpPr>
+        <p:sp>
+          <p:nvSpPr>
+            <p:cNvPr id="6" name="TextBox 5">
+              <a:extLst>
+                <a:ext uri="{FF2B5EF4-FFF2-40B4-BE49-F238E27FC236}">
+                  <a16:creationId xmlns:a16="http://schemas.microsoft.com/office/drawing/2014/main" id="{D9AA63A4-E921-45B7-C661-343F95AC1E29}"/>
+                </a:ext>
+              </a:extLst>
+            </p:cNvPr>
+            <p:cNvSpPr txBox="1"/>
+            <p:nvPr/>
+          </p:nvSpPr>
+          <p:spPr>
+            <a:xfrm>
+              <a:off x="7571232" y="2809779"/>
+              <a:ext cx="2770632" cy="1238442"/>
+            </a:xfrm>
+            <a:prstGeom prst="rect">
+              <a:avLst/>
+            </a:prstGeom>
+            <a:noFill/>
+          </p:spPr>
+          <p:txBody>
+            <a:bodyPr wrap="square" rtlCol="0">
+              <a:spAutoFit/>
+            </a:bodyPr>
+            <a:lstStyle/>
+            <a:p>
+              <a:r>
+                <a:rPr lang="en-CA" sz="2400" b="1" dirty="0">
+                  <a:latin typeface="Helvetica" panose="020B0604020202020204" pitchFamily="34" charset="0"/>
+                  <a:cs typeface="Helvetica" panose="020B0604020202020204" pitchFamily="34" charset="0"/>
+                </a:rPr>
+                <a:t>Isolated female</a:t>
+              </a:r>
+              <a:br>
+                <a:rPr lang="en-CA" sz="2400" b="1" dirty="0">
+                  <a:latin typeface="Helvetica" panose="020B0604020202020204" pitchFamily="34" charset="0"/>
+                  <a:cs typeface="Helvetica" panose="020B0604020202020204" pitchFamily="34" charset="0"/>
+                </a:rPr>
+              </a:br>
+              <a:r>
+                <a:rPr lang="en-CA" sz="2400" b="1" dirty="0">
+                  <a:latin typeface="Helvetica" panose="020B0604020202020204" pitchFamily="34" charset="0"/>
+                  <a:cs typeface="Helvetica" panose="020B0604020202020204" pitchFamily="34" charset="0"/>
+                </a:rPr>
+                <a:t>Social female</a:t>
+              </a:r>
+              <a:br>
+                <a:rPr lang="en-CA" sz="2400" b="1" dirty="0">
+                  <a:latin typeface="Helvetica" panose="020B0604020202020204" pitchFamily="34" charset="0"/>
+                  <a:cs typeface="Helvetica" panose="020B0604020202020204" pitchFamily="34" charset="0"/>
+                </a:rPr>
+              </a:br>
+              <a:r>
+                <a:rPr lang="en-CA" sz="2400" b="1" dirty="0">
+                  <a:latin typeface="Helvetica" panose="020B0604020202020204" pitchFamily="34" charset="0"/>
+                  <a:cs typeface="Helvetica" panose="020B0604020202020204" pitchFamily="34" charset="0"/>
+                </a:rPr>
+                <a:t>Male</a:t>
+              </a:r>
+            </a:p>
+          </p:txBody>
+        </p:sp>
+        <p:sp>
+          <p:nvSpPr>
+            <p:cNvPr id="7" name="Oval 6">
+              <a:extLst>
+                <a:ext uri="{FF2B5EF4-FFF2-40B4-BE49-F238E27FC236}">
+                  <a16:creationId xmlns:a16="http://schemas.microsoft.com/office/drawing/2014/main" id="{B92A975E-9E9C-19E8-EBED-D236B0287CAA}"/>
+                </a:ext>
+              </a:extLst>
+            </p:cNvPr>
+            <p:cNvSpPr/>
+            <p:nvPr/>
+          </p:nvSpPr>
+          <p:spPr>
+            <a:xfrm>
+              <a:off x="7324344" y="2922794"/>
+              <a:ext cx="265176" cy="256032"/>
+            </a:xfrm>
+            <a:prstGeom prst="ellipse">
+              <a:avLst/>
+            </a:prstGeom>
+            <a:solidFill>
+              <a:srgbClr val="F6BD60"/>
+            </a:solidFill>
+            <a:ln>
+              <a:solidFill>
+                <a:schemeClr val="tx1"/>
+              </a:solidFill>
+            </a:ln>
+          </p:spPr>
+          <p:style>
+            <a:lnRef idx="2">
+              <a:schemeClr val="accent1">
+                <a:shade val="50000"/>
+              </a:schemeClr>
+            </a:lnRef>
+            <a:fillRef idx="1">
+              <a:schemeClr val="accent1"/>
+            </a:fillRef>
+            <a:effectRef idx="0">
+              <a:schemeClr val="accent1"/>
+            </a:effectRef>
+            <a:fontRef idx="minor">
+              <a:schemeClr val="lt1"/>
+            </a:fontRef>
+          </p:style>
+          <p:txBody>
+            <a:bodyPr rtlCol="0" anchor="ctr"/>
+            <a:lstStyle/>
+            <a:p>
+              <a:pPr algn="ctr"/>
+              <a:endParaRPr lang="en-CA"/>
+            </a:p>
+          </p:txBody>
+        </p:sp>
+        <p:sp>
+          <p:nvSpPr>
+            <p:cNvPr id="8" name="Oval 7">
+              <a:extLst>
+                <a:ext uri="{FF2B5EF4-FFF2-40B4-BE49-F238E27FC236}">
+                  <a16:creationId xmlns:a16="http://schemas.microsoft.com/office/drawing/2014/main" id="{85BC77D5-BDDF-ED2C-D631-2F1252864D41}"/>
+                </a:ext>
+              </a:extLst>
+            </p:cNvPr>
+            <p:cNvSpPr/>
+            <p:nvPr/>
+          </p:nvSpPr>
+          <p:spPr>
+            <a:xfrm>
+              <a:off x="7324344" y="3291841"/>
+              <a:ext cx="265176" cy="256032"/>
+            </a:xfrm>
+            <a:prstGeom prst="ellipse">
+              <a:avLst/>
+            </a:prstGeom>
+            <a:solidFill>
+              <a:srgbClr val="F77F00"/>
+            </a:solidFill>
+            <a:ln>
+              <a:solidFill>
+                <a:schemeClr val="tx1"/>
+              </a:solidFill>
+            </a:ln>
+          </p:spPr>
+          <p:style>
+            <a:lnRef idx="2">
+              <a:schemeClr val="accent1">
+                <a:shade val="50000"/>
+              </a:schemeClr>
+            </a:lnRef>
+            <a:fillRef idx="1">
+              <a:schemeClr val="accent1"/>
+            </a:fillRef>
+            <a:effectRef idx="0">
+              <a:schemeClr val="accent1"/>
+            </a:effectRef>
+            <a:fontRef idx="minor">
+              <a:schemeClr val="lt1"/>
+            </a:fontRef>
+          </p:style>
+          <p:txBody>
+            <a:bodyPr rtlCol="0" anchor="ctr"/>
+            <a:lstStyle/>
+            <a:p>
+              <a:pPr algn="ctr"/>
+              <a:endParaRPr lang="en-CA"/>
+            </a:p>
+          </p:txBody>
+        </p:sp>
+        <p:sp>
+          <p:nvSpPr>
+            <p:cNvPr id="9" name="Oval 8">
+              <a:extLst>
+                <a:ext uri="{FF2B5EF4-FFF2-40B4-BE49-F238E27FC236}">
+                  <a16:creationId xmlns:a16="http://schemas.microsoft.com/office/drawing/2014/main" id="{2C984C66-739B-F027-E8F1-C6DBD46786A2}"/>
+                </a:ext>
+              </a:extLst>
+            </p:cNvPr>
+            <p:cNvSpPr/>
+            <p:nvPr/>
+          </p:nvSpPr>
+          <p:spPr>
+            <a:xfrm>
+              <a:off x="7324344" y="3660888"/>
+              <a:ext cx="265176" cy="256032"/>
+            </a:xfrm>
+            <a:prstGeom prst="ellipse">
+              <a:avLst/>
+            </a:prstGeom>
+            <a:solidFill>
+              <a:srgbClr val="108AB2"/>
+            </a:solidFill>
+            <a:ln>
+              <a:solidFill>
+                <a:schemeClr val="tx1"/>
+              </a:solidFill>
+            </a:ln>
+          </p:spPr>
+          <p:style>
+            <a:lnRef idx="2">
+              <a:schemeClr val="accent1">
+                <a:shade val="50000"/>
+              </a:schemeClr>
+            </a:lnRef>
+            <a:fillRef idx="1">
+              <a:schemeClr val="accent1"/>
+            </a:fillRef>
+            <a:effectRef idx="0">
+              <a:schemeClr val="accent1"/>
+            </a:effectRef>
+            <a:fontRef idx="minor">
+              <a:schemeClr val="lt1"/>
+            </a:fontRef>
+          </p:style>
+          <p:txBody>
+            <a:bodyPr rtlCol="0" anchor="ctr"/>
+            <a:lstStyle/>
+            <a:p>
+              <a:pPr algn="ctr"/>
+              <a:endParaRPr lang="en-CA" dirty="0"/>
+            </a:p>
+          </p:txBody>
+        </p:sp>
+      </p:grpSp>
+    </p:spTree>
+    <p:extLst>
+      <p:ext uri="{BB962C8B-B14F-4D97-AF65-F5344CB8AC3E}">
+        <p14:creationId xmlns:p14="http://schemas.microsoft.com/office/powerpoint/2010/main" val="2589655897"/>
+      </p:ext>
+    </p:extLst>
+  </p:cSld>
+  <p:clrMapOvr>
+    <a:masterClrMapping/>
+  </p:clrMapOvr>
+</p:sld>
+</file>
+
+<file path=ppt/slides/slide6.xml><?xml version="1.0" encoding="utf-8"?>
+<p:sld xmlns:a="http://schemas.openxmlformats.org/drawingml/2006/main" xmlns:r="http://schemas.openxmlformats.org/officeDocument/2006/relationships" xmlns:p="http://schemas.openxmlformats.org/presentationml/2006/main">
+  <p:cSld>
+    <p:spTree>
+      <p:nvGrpSpPr>
+        <p:cNvPr id="1" name=""/>
+        <p:cNvGrpSpPr/>
+        <p:nvPr/>
+      </p:nvGrpSpPr>
+      <p:grpSpPr>
+        <a:xfrm>
+          <a:off x="0" y="0"/>
+          <a:ext cx="0" cy="0"/>
+          <a:chOff x="0" y="0"/>
+          <a:chExt cx="0" cy="0"/>
+        </a:xfrm>
+      </p:grpSpPr>
+      <p:pic>
+        <p:nvPicPr>
+          <p:cNvPr id="10" name="Picture 9">
+            <a:extLst>
+              <a:ext uri="{FF2B5EF4-FFF2-40B4-BE49-F238E27FC236}">
+                <a16:creationId xmlns:a16="http://schemas.microsoft.com/office/drawing/2014/main" id="{CE6C8DCF-79FB-A1B1-0D03-9FA251CAF8D0}"/>
+              </a:ext>
+            </a:extLst>
+          </p:cNvPr>
+          <p:cNvPicPr>
+            <a:picLocks noChangeAspect="1"/>
+          </p:cNvPicPr>
+          <p:nvPr/>
+        </p:nvPicPr>
+        <p:blipFill>
+          <a:blip r:embed="rId2"/>
+          <a:stretch>
+            <a:fillRect/>
+          </a:stretch>
+        </p:blipFill>
+        <p:spPr>
+          <a:xfrm>
+            <a:off x="474197" y="705147"/>
+            <a:ext cx="5237755" cy="5721398"/>
+          </a:xfrm>
+          <a:prstGeom prst="rect">
+            <a:avLst/>
+          </a:prstGeom>
+        </p:spPr>
+      </p:pic>
+      <p:sp>
+        <p:nvSpPr>
+          <p:cNvPr id="4" name="TextBox 3">
+            <a:extLst>
+              <a:ext uri="{FF2B5EF4-FFF2-40B4-BE49-F238E27FC236}">
+                <a16:creationId xmlns:a16="http://schemas.microsoft.com/office/drawing/2014/main" id="{A9273956-D752-F5CC-6DAF-7CB89FA87092}"/>
+              </a:ext>
+            </a:extLst>
+          </p:cNvPr>
+          <p:cNvSpPr txBox="1"/>
+          <p:nvPr/>
+        </p:nvSpPr>
+        <p:spPr>
+          <a:xfrm>
+            <a:off x="164592" y="181927"/>
+            <a:ext cx="7242048" cy="523220"/>
+          </a:xfrm>
+          <a:prstGeom prst="rect">
+            <a:avLst/>
+          </a:prstGeom>
+          <a:noFill/>
+        </p:spPr>
+        <p:txBody>
+          <a:bodyPr wrap="square" rtlCol="0">
+            <a:spAutoFit/>
+          </a:bodyPr>
+          <a:lstStyle/>
+          <a:p>
+            <a:r>
+              <a:rPr lang="en-CA" sz="2800" b="1" dirty="0">
+                <a:latin typeface="Helvetica" panose="020B0604020202020204" pitchFamily="34" charset="0"/>
+                <a:cs typeface="Helvetica" panose="020B0604020202020204" pitchFamily="34" charset="0"/>
+              </a:rPr>
+              <a:t>Replicate 6: Insemination network</a:t>
+            </a:r>
+          </a:p>
+        </p:txBody>
+      </p:sp>
+      <p:grpSp>
+        <p:nvGrpSpPr>
+          <p:cNvPr id="5" name="Group 4">
+            <a:extLst>
+              <a:ext uri="{FF2B5EF4-FFF2-40B4-BE49-F238E27FC236}">
+                <a16:creationId xmlns:a16="http://schemas.microsoft.com/office/drawing/2014/main" id="{9DCAD885-626D-3893-C3E2-BB6382C0F19E}"/>
+              </a:ext>
+            </a:extLst>
+          </p:cNvPr>
+          <p:cNvGrpSpPr/>
+          <p:nvPr/>
+        </p:nvGrpSpPr>
+        <p:grpSpPr>
+          <a:xfrm>
+            <a:off x="5711952" y="4256543"/>
+            <a:ext cx="3017520" cy="1238442"/>
+            <a:chOff x="7324344" y="2809779"/>
+            <a:chExt cx="3017520" cy="1238442"/>
+          </a:xfrm>
+        </p:grpSpPr>
+        <p:sp>
+          <p:nvSpPr>
+            <p:cNvPr id="6" name="TextBox 5">
+              <a:extLst>
+                <a:ext uri="{FF2B5EF4-FFF2-40B4-BE49-F238E27FC236}">
+                  <a16:creationId xmlns:a16="http://schemas.microsoft.com/office/drawing/2014/main" id="{D9AA63A4-E921-45B7-C661-343F95AC1E29}"/>
+                </a:ext>
+              </a:extLst>
+            </p:cNvPr>
+            <p:cNvSpPr txBox="1"/>
+            <p:nvPr/>
+          </p:nvSpPr>
+          <p:spPr>
+            <a:xfrm>
+              <a:off x="7571232" y="2809779"/>
+              <a:ext cx="2770632" cy="1238442"/>
+            </a:xfrm>
+            <a:prstGeom prst="rect">
+              <a:avLst/>
+            </a:prstGeom>
+            <a:noFill/>
+          </p:spPr>
+          <p:txBody>
+            <a:bodyPr wrap="square" rtlCol="0">
+              <a:spAutoFit/>
+            </a:bodyPr>
+            <a:lstStyle/>
+            <a:p>
+              <a:r>
+                <a:rPr lang="en-CA" sz="2400" b="1" dirty="0">
+                  <a:latin typeface="Helvetica" panose="020B0604020202020204" pitchFamily="34" charset="0"/>
+                  <a:cs typeface="Helvetica" panose="020B0604020202020204" pitchFamily="34" charset="0"/>
+                </a:rPr>
+                <a:t>Isolated female</a:t>
+              </a:r>
+              <a:br>
+                <a:rPr lang="en-CA" sz="2400" b="1" dirty="0">
+                  <a:latin typeface="Helvetica" panose="020B0604020202020204" pitchFamily="34" charset="0"/>
+                  <a:cs typeface="Helvetica" panose="020B0604020202020204" pitchFamily="34" charset="0"/>
+                </a:rPr>
+              </a:br>
+              <a:r>
+                <a:rPr lang="en-CA" sz="2400" b="1" dirty="0">
+                  <a:latin typeface="Helvetica" panose="020B0604020202020204" pitchFamily="34" charset="0"/>
+                  <a:cs typeface="Helvetica" panose="020B0604020202020204" pitchFamily="34" charset="0"/>
+                </a:rPr>
+                <a:t>Social female</a:t>
+              </a:r>
+              <a:br>
+                <a:rPr lang="en-CA" sz="2400" b="1" dirty="0">
+                  <a:latin typeface="Helvetica" panose="020B0604020202020204" pitchFamily="34" charset="0"/>
+                  <a:cs typeface="Helvetica" panose="020B0604020202020204" pitchFamily="34" charset="0"/>
+                </a:rPr>
+              </a:br>
+              <a:r>
+                <a:rPr lang="en-CA" sz="2400" b="1" dirty="0">
+                  <a:latin typeface="Helvetica" panose="020B0604020202020204" pitchFamily="34" charset="0"/>
+                  <a:cs typeface="Helvetica" panose="020B0604020202020204" pitchFamily="34" charset="0"/>
+                </a:rPr>
+                <a:t>Male</a:t>
+              </a:r>
+            </a:p>
+          </p:txBody>
+        </p:sp>
+        <p:sp>
+          <p:nvSpPr>
+            <p:cNvPr id="7" name="Oval 6">
+              <a:extLst>
+                <a:ext uri="{FF2B5EF4-FFF2-40B4-BE49-F238E27FC236}">
+                  <a16:creationId xmlns:a16="http://schemas.microsoft.com/office/drawing/2014/main" id="{B92A975E-9E9C-19E8-EBED-D236B0287CAA}"/>
+                </a:ext>
+              </a:extLst>
+            </p:cNvPr>
+            <p:cNvSpPr/>
+            <p:nvPr/>
+          </p:nvSpPr>
+          <p:spPr>
+            <a:xfrm>
+              <a:off x="7324344" y="2922794"/>
+              <a:ext cx="265176" cy="256032"/>
+            </a:xfrm>
+            <a:prstGeom prst="ellipse">
+              <a:avLst/>
+            </a:prstGeom>
+            <a:solidFill>
+              <a:srgbClr val="F6BD60"/>
+            </a:solidFill>
+            <a:ln>
+              <a:solidFill>
+                <a:schemeClr val="tx1"/>
+              </a:solidFill>
+            </a:ln>
+          </p:spPr>
+          <p:style>
+            <a:lnRef idx="2">
+              <a:schemeClr val="accent1">
+                <a:shade val="50000"/>
+              </a:schemeClr>
+            </a:lnRef>
+            <a:fillRef idx="1">
+              <a:schemeClr val="accent1"/>
+            </a:fillRef>
+            <a:effectRef idx="0">
+              <a:schemeClr val="accent1"/>
+            </a:effectRef>
+            <a:fontRef idx="minor">
+              <a:schemeClr val="lt1"/>
+            </a:fontRef>
+          </p:style>
+          <p:txBody>
+            <a:bodyPr rtlCol="0" anchor="ctr"/>
+            <a:lstStyle/>
+            <a:p>
+              <a:pPr algn="ctr"/>
+              <a:endParaRPr lang="en-CA"/>
+            </a:p>
+          </p:txBody>
+        </p:sp>
+        <p:sp>
+          <p:nvSpPr>
+            <p:cNvPr id="8" name="Oval 7">
+              <a:extLst>
+                <a:ext uri="{FF2B5EF4-FFF2-40B4-BE49-F238E27FC236}">
+                  <a16:creationId xmlns:a16="http://schemas.microsoft.com/office/drawing/2014/main" id="{85BC77D5-BDDF-ED2C-D631-2F1252864D41}"/>
+                </a:ext>
+              </a:extLst>
+            </p:cNvPr>
+            <p:cNvSpPr/>
+            <p:nvPr/>
+          </p:nvSpPr>
+          <p:spPr>
+            <a:xfrm>
+              <a:off x="7324344" y="3291841"/>
+              <a:ext cx="265176" cy="256032"/>
+            </a:xfrm>
+            <a:prstGeom prst="ellipse">
+              <a:avLst/>
+            </a:prstGeom>
+            <a:solidFill>
+              <a:srgbClr val="F77F00"/>
+            </a:solidFill>
+            <a:ln>
+              <a:solidFill>
+                <a:schemeClr val="tx1"/>
+              </a:solidFill>
+            </a:ln>
+          </p:spPr>
+          <p:style>
+            <a:lnRef idx="2">
+              <a:schemeClr val="accent1">
+                <a:shade val="50000"/>
+              </a:schemeClr>
+            </a:lnRef>
+            <a:fillRef idx="1">
+              <a:schemeClr val="accent1"/>
+            </a:fillRef>
+            <a:effectRef idx="0">
+              <a:schemeClr val="accent1"/>
+            </a:effectRef>
+            <a:fontRef idx="minor">
+              <a:schemeClr val="lt1"/>
+            </a:fontRef>
+          </p:style>
+          <p:txBody>
+            <a:bodyPr rtlCol="0" anchor="ctr"/>
+            <a:lstStyle/>
+            <a:p>
+              <a:pPr algn="ctr"/>
+              <a:endParaRPr lang="en-CA"/>
+            </a:p>
+          </p:txBody>
+        </p:sp>
+        <p:sp>
+          <p:nvSpPr>
+            <p:cNvPr id="9" name="Oval 8">
+              <a:extLst>
+                <a:ext uri="{FF2B5EF4-FFF2-40B4-BE49-F238E27FC236}">
+                  <a16:creationId xmlns:a16="http://schemas.microsoft.com/office/drawing/2014/main" id="{2C984C66-739B-F027-E8F1-C6DBD46786A2}"/>
+                </a:ext>
+              </a:extLst>
+            </p:cNvPr>
+            <p:cNvSpPr/>
+            <p:nvPr/>
+          </p:nvSpPr>
+          <p:spPr>
+            <a:xfrm>
+              <a:off x="7324344" y="3660888"/>
+              <a:ext cx="265176" cy="256032"/>
+            </a:xfrm>
+            <a:prstGeom prst="ellipse">
+              <a:avLst/>
+            </a:prstGeom>
+            <a:solidFill>
+              <a:srgbClr val="108AB2"/>
+            </a:solidFill>
+            <a:ln>
+              <a:solidFill>
+                <a:schemeClr val="tx1"/>
+              </a:solidFill>
+            </a:ln>
+          </p:spPr>
+          <p:style>
+            <a:lnRef idx="2">
+              <a:schemeClr val="accent1">
+                <a:shade val="50000"/>
+              </a:schemeClr>
+            </a:lnRef>
+            <a:fillRef idx="1">
+              <a:schemeClr val="accent1"/>
+            </a:fillRef>
+            <a:effectRef idx="0">
+              <a:schemeClr val="accent1"/>
+            </a:effectRef>
+            <a:fontRef idx="minor">
+              <a:schemeClr val="lt1"/>
+            </a:fontRef>
+          </p:style>
+          <p:txBody>
+            <a:bodyPr rtlCol="0" anchor="ctr"/>
+            <a:lstStyle/>
+            <a:p>
+              <a:pPr algn="ctr"/>
+              <a:endParaRPr lang="en-CA" dirty="0"/>
+            </a:p>
+          </p:txBody>
+        </p:sp>
+      </p:grpSp>
+    </p:spTree>
+    <p:extLst>
+      <p:ext uri="{BB962C8B-B14F-4D97-AF65-F5344CB8AC3E}">
+        <p14:creationId xmlns:p14="http://schemas.microsoft.com/office/powerpoint/2010/main" val="3579569517"/>
+      </p:ext>
+    </p:extLst>
+  </p:cSld>
+  <p:clrMapOvr>
+    <a:masterClrMapping/>
+  </p:clrMapOvr>
+</p:sld>
+</file>
+
+<file path=ppt/slides/slide7.xml><?xml version="1.0" encoding="utf-8"?>
+<p:sld xmlns:a="http://schemas.openxmlformats.org/drawingml/2006/main" xmlns:r="http://schemas.openxmlformats.org/officeDocument/2006/relationships" xmlns:p="http://schemas.openxmlformats.org/presentationml/2006/main">
+  <p:cSld>
+    <p:spTree>
+      <p:nvGrpSpPr>
+        <p:cNvPr id="1" name=""/>
+        <p:cNvGrpSpPr/>
+        <p:nvPr/>
+      </p:nvGrpSpPr>
+      <p:grpSpPr>
+        <a:xfrm>
+          <a:off x="0" y="0"/>
+          <a:ext cx="0" cy="0"/>
+          <a:chOff x="0" y="0"/>
+          <a:chExt cx="0" cy="0"/>
+        </a:xfrm>
+      </p:grpSpPr>
+      <p:pic>
+        <p:nvPicPr>
+          <p:cNvPr id="3" name="Picture 2">
+            <a:extLst>
+              <a:ext uri="{FF2B5EF4-FFF2-40B4-BE49-F238E27FC236}">
+                <a16:creationId xmlns:a16="http://schemas.microsoft.com/office/drawing/2014/main" id="{3F03714F-D54C-2086-D50E-8D8EF2613C68}"/>
+              </a:ext>
+            </a:extLst>
+          </p:cNvPr>
+          <p:cNvPicPr>
+            <a:picLocks noChangeAspect="1"/>
+          </p:cNvPicPr>
+          <p:nvPr/>
+        </p:nvPicPr>
+        <p:blipFill>
+          <a:blip r:embed="rId2"/>
+          <a:stretch>
+            <a:fillRect/>
+          </a:stretch>
+        </p:blipFill>
+        <p:spPr>
+          <a:xfrm>
+            <a:off x="653471" y="313890"/>
+            <a:ext cx="4648849" cy="6230219"/>
+          </a:xfrm>
+          <a:prstGeom prst="rect">
+            <a:avLst/>
+          </a:prstGeom>
+        </p:spPr>
+      </p:pic>
+      <p:pic>
+        <p:nvPicPr>
+          <p:cNvPr id="5" name="Picture 4">
+            <a:extLst>
+              <a:ext uri="{FF2B5EF4-FFF2-40B4-BE49-F238E27FC236}">
+                <a16:creationId xmlns:a16="http://schemas.microsoft.com/office/drawing/2014/main" id="{7023F968-98C4-7077-5F53-7A3CFF8A8A44}"/>
+              </a:ext>
+            </a:extLst>
+          </p:cNvPr>
+          <p:cNvPicPr>
+            <a:picLocks noChangeAspect="1"/>
+          </p:cNvPicPr>
+          <p:nvPr/>
+        </p:nvPicPr>
+        <p:blipFill>
+          <a:blip r:embed="rId3"/>
+          <a:stretch>
+            <a:fillRect/>
+          </a:stretch>
+        </p:blipFill>
+        <p:spPr>
+          <a:xfrm>
+            <a:off x="5683454" y="1271285"/>
+            <a:ext cx="6296904" cy="4315427"/>
+          </a:xfrm>
+          <a:prstGeom prst="rect">
+            <a:avLst/>
+          </a:prstGeom>
+        </p:spPr>
+      </p:pic>
+      <p:sp>
+        <p:nvSpPr>
+          <p:cNvPr id="6" name="Rectangle 5">
+            <a:extLst>
+              <a:ext uri="{FF2B5EF4-FFF2-40B4-BE49-F238E27FC236}">
+                <a16:creationId xmlns:a16="http://schemas.microsoft.com/office/drawing/2014/main" id="{B85BB1C4-4D03-04D8-9AF3-45FFA04C8BA2}"/>
+              </a:ext>
+            </a:extLst>
+          </p:cNvPr>
+          <p:cNvSpPr/>
+          <p:nvPr/>
+        </p:nvSpPr>
+        <p:spPr>
+          <a:xfrm>
+            <a:off x="9226669" y="4862928"/>
+            <a:ext cx="634482" cy="158621"/>
+          </a:xfrm>
+          <a:prstGeom prst="rect">
+            <a:avLst/>
+          </a:prstGeom>
+          <a:noFill/>
+          <a:ln>
+            <a:solidFill>
+              <a:schemeClr val="accent6"/>
+            </a:solidFill>
+          </a:ln>
+        </p:spPr>
+        <p:style>
+          <a:lnRef idx="2">
+            <a:schemeClr val="accent1">
+              <a:shade val="50000"/>
+            </a:schemeClr>
+          </a:lnRef>
+          <a:fillRef idx="1">
+            <a:schemeClr val="accent1"/>
+          </a:fillRef>
+          <a:effectRef idx="0">
+            <a:schemeClr val="accent1"/>
+          </a:effectRef>
+          <a:fontRef idx="minor">
+            <a:schemeClr val="lt1"/>
+          </a:fontRef>
+        </p:style>
+        <p:txBody>
+          <a:bodyPr rtlCol="0" anchor="ctr"/>
+          <a:lstStyle/>
+          <a:p>
+            <a:pPr algn="ctr"/>
+            <a:endParaRPr lang="en-CA"/>
+          </a:p>
+        </p:txBody>
+      </p:sp>
+    </p:spTree>
+    <p:extLst>
+      <p:ext uri="{BB962C8B-B14F-4D97-AF65-F5344CB8AC3E}">
+        <p14:creationId xmlns:p14="http://schemas.microsoft.com/office/powerpoint/2010/main" val="3632562938"/>
+      </p:ext>
+    </p:extLst>
+  </p:cSld>
+  <p:clrMapOvr>
+    <a:masterClrMapping/>
+  </p:clrMapOvr>
+</p:sld>
+</file>
+
+<file path=ppt/slides/slide8.xml><?xml version="1.0" encoding="utf-8"?>
+<p:sld xmlns:a="http://schemas.openxmlformats.org/drawingml/2006/main" xmlns:r="http://schemas.openxmlformats.org/officeDocument/2006/relationships" xmlns:p="http://schemas.openxmlformats.org/presentationml/2006/main">
+  <p:cSld>
+    <p:spTree>
+      <p:nvGrpSpPr>
+        <p:cNvPr id="1" name=""/>
+        <p:cNvGrpSpPr/>
+        <p:nvPr/>
+      </p:nvGrpSpPr>
+      <p:grpSpPr>
+        <a:xfrm>
+          <a:off x="0" y="0"/>
+          <a:ext cx="0" cy="0"/>
+          <a:chOff x="0" y="0"/>
+          <a:chExt cx="0" cy="0"/>
+        </a:xfrm>
+      </p:grpSpPr>
+      <p:pic>
+        <p:nvPicPr>
+          <p:cNvPr id="3" name="Picture 2">
+            <a:extLst>
+              <a:ext uri="{FF2B5EF4-FFF2-40B4-BE49-F238E27FC236}">
+                <a16:creationId xmlns:a16="http://schemas.microsoft.com/office/drawing/2014/main" id="{56516544-B08D-BE7C-F52F-F8546E38A43D}"/>
+              </a:ext>
+            </a:extLst>
+          </p:cNvPr>
+          <p:cNvPicPr>
+            <a:picLocks noChangeAspect="1"/>
+          </p:cNvPicPr>
+          <p:nvPr/>
+        </p:nvPicPr>
+        <p:blipFill>
+          <a:blip r:embed="rId2"/>
+          <a:stretch>
+            <a:fillRect/>
+          </a:stretch>
+        </p:blipFill>
+        <p:spPr>
+          <a:xfrm>
+            <a:off x="625657" y="323416"/>
+            <a:ext cx="4667901" cy="6211167"/>
+          </a:xfrm>
+          <a:prstGeom prst="rect">
+            <a:avLst/>
+          </a:prstGeom>
+        </p:spPr>
+      </p:pic>
+      <p:pic>
+        <p:nvPicPr>
+          <p:cNvPr id="5" name="Picture 4">
+            <a:extLst>
+              <a:ext uri="{FF2B5EF4-FFF2-40B4-BE49-F238E27FC236}">
+                <a16:creationId xmlns:a16="http://schemas.microsoft.com/office/drawing/2014/main" id="{9BAD80BE-AD61-A831-453D-2F3242B32344}"/>
+              </a:ext>
+            </a:extLst>
+          </p:cNvPr>
+          <p:cNvPicPr>
+            <a:picLocks noChangeAspect="1"/>
+          </p:cNvPicPr>
+          <p:nvPr/>
+        </p:nvPicPr>
+        <p:blipFill>
+          <a:blip r:embed="rId3"/>
+          <a:stretch>
+            <a:fillRect/>
+          </a:stretch>
+        </p:blipFill>
+        <p:spPr>
+          <a:xfrm>
+            <a:off x="5647645" y="956916"/>
+            <a:ext cx="6315956" cy="4944165"/>
+          </a:xfrm>
+          <a:prstGeom prst="rect">
+            <a:avLst/>
+          </a:prstGeom>
+        </p:spPr>
+      </p:pic>
+      <p:sp>
+        <p:nvSpPr>
+          <p:cNvPr id="6" name="Rectangle 5">
+            <a:extLst>
+              <a:ext uri="{FF2B5EF4-FFF2-40B4-BE49-F238E27FC236}">
+                <a16:creationId xmlns:a16="http://schemas.microsoft.com/office/drawing/2014/main" id="{CD16205F-CEF0-5D39-65C9-2F08E2F91E0C}"/>
+              </a:ext>
+            </a:extLst>
+          </p:cNvPr>
+          <p:cNvSpPr/>
+          <p:nvPr/>
+        </p:nvSpPr>
+        <p:spPr>
+          <a:xfrm>
+            <a:off x="9171805" y="4524600"/>
+            <a:ext cx="634482" cy="158621"/>
+          </a:xfrm>
+          <a:prstGeom prst="rect">
+            <a:avLst/>
+          </a:prstGeom>
+          <a:noFill/>
+          <a:ln>
+            <a:solidFill>
+              <a:schemeClr val="accent6"/>
+            </a:solidFill>
+          </a:ln>
+        </p:spPr>
+        <p:style>
+          <a:lnRef idx="2">
+            <a:schemeClr val="accent1">
+              <a:shade val="50000"/>
+            </a:schemeClr>
+          </a:lnRef>
+          <a:fillRef idx="1">
+            <a:schemeClr val="accent1"/>
+          </a:fillRef>
+          <a:effectRef idx="0">
+            <a:schemeClr val="accent1"/>
+          </a:effectRef>
+          <a:fontRef idx="minor">
+            <a:schemeClr val="lt1"/>
+          </a:fontRef>
+        </p:style>
+        <p:txBody>
+          <a:bodyPr rtlCol="0" anchor="ctr"/>
+          <a:lstStyle/>
+          <a:p>
+            <a:pPr algn="ctr"/>
+            <a:endParaRPr lang="en-CA"/>
+          </a:p>
+        </p:txBody>
+      </p:sp>
+    </p:spTree>
+    <p:extLst>
+      <p:ext uri="{BB962C8B-B14F-4D97-AF65-F5344CB8AC3E}">
+        <p14:creationId xmlns:p14="http://schemas.microsoft.com/office/powerpoint/2010/main" val="3262892201"/>
+      </p:ext>
+    </p:extLst>
+  </p:cSld>
+  <p:clrMapOvr>
+    <a:masterClrMapping/>
+  </p:clrMapOvr>
+</p:sld>
+</file>
+
+<file path=ppt/slides/slide9.xml><?xml version="1.0" encoding="utf-8"?>
+<p:sld xmlns:a="http://schemas.openxmlformats.org/drawingml/2006/main" xmlns:r="http://schemas.openxmlformats.org/officeDocument/2006/relationships" xmlns:p="http://schemas.openxmlformats.org/presentationml/2006/main">
+  <p:cSld>
+    <p:spTree>
+      <p:nvGrpSpPr>
+        <p:cNvPr id="1" name=""/>
+        <p:cNvGrpSpPr/>
+        <p:nvPr/>
+      </p:nvGrpSpPr>
+      <p:grpSpPr>
+        <a:xfrm>
+          <a:off x="0" y="0"/>
+          <a:ext cx="0" cy="0"/>
+          <a:chOff x="0" y="0"/>
+          <a:chExt cx="0" cy="0"/>
+        </a:xfrm>
+      </p:grpSpPr>
+      <p:pic>
+        <p:nvPicPr>
+          <p:cNvPr id="3" name="Picture 2">
+            <a:extLst>
+              <a:ext uri="{FF2B5EF4-FFF2-40B4-BE49-F238E27FC236}">
+                <a16:creationId xmlns:a16="http://schemas.microsoft.com/office/drawing/2014/main" id="{3513DB43-ECF1-9AD4-41E1-BCB18633ED81}"/>
+              </a:ext>
+            </a:extLst>
+          </p:cNvPr>
+          <p:cNvPicPr>
+            <a:picLocks noChangeAspect="1"/>
+          </p:cNvPicPr>
+          <p:nvPr/>
+        </p:nvPicPr>
+        <p:blipFill>
+          <a:blip r:embed="rId2"/>
+          <a:stretch>
+            <a:fillRect/>
+          </a:stretch>
+        </p:blipFill>
+        <p:spPr>
+          <a:xfrm>
+            <a:off x="302676" y="399345"/>
+            <a:ext cx="5175277" cy="6059310"/>
+          </a:xfrm>
+          <a:prstGeom prst="rect">
+            <a:avLst/>
+          </a:prstGeom>
+        </p:spPr>
+      </p:pic>
+      <p:pic>
+        <p:nvPicPr>
+          <p:cNvPr id="5" name="Picture 4">
+            <a:extLst>
+              <a:ext uri="{FF2B5EF4-FFF2-40B4-BE49-F238E27FC236}">
+                <a16:creationId xmlns:a16="http://schemas.microsoft.com/office/drawing/2014/main" id="{DF99C806-4F32-50B7-8CE2-48D1DDA7F1EB}"/>
+              </a:ext>
+            </a:extLst>
+          </p:cNvPr>
+          <p:cNvPicPr>
+            <a:picLocks noChangeAspect="1"/>
+          </p:cNvPicPr>
+          <p:nvPr/>
+        </p:nvPicPr>
+        <p:blipFill>
+          <a:blip r:embed="rId3"/>
+          <a:stretch>
+            <a:fillRect/>
+          </a:stretch>
+        </p:blipFill>
+        <p:spPr>
+          <a:xfrm>
+            <a:off x="5854348" y="1131993"/>
+            <a:ext cx="6212258" cy="4594014"/>
+          </a:xfrm>
+          <a:prstGeom prst="rect">
+            <a:avLst/>
+          </a:prstGeom>
+        </p:spPr>
+      </p:pic>
+      <p:sp>
+        <p:nvSpPr>
+          <p:cNvPr id="6" name="Rectangle 5">
+            <a:extLst>
+              <a:ext uri="{FF2B5EF4-FFF2-40B4-BE49-F238E27FC236}">
+                <a16:creationId xmlns:a16="http://schemas.microsoft.com/office/drawing/2014/main" id="{683FFF83-869B-96B6-813B-40DF5FD8FA0C}"/>
+              </a:ext>
+            </a:extLst>
+          </p:cNvPr>
+          <p:cNvSpPr/>
+          <p:nvPr/>
+        </p:nvSpPr>
+        <p:spPr>
+          <a:xfrm>
+            <a:off x="9180949" y="4478880"/>
+            <a:ext cx="634482" cy="158621"/>
+          </a:xfrm>
+          <a:prstGeom prst="rect">
+            <a:avLst/>
+          </a:prstGeom>
+          <a:noFill/>
+          <a:ln>
+            <a:solidFill>
+              <a:schemeClr val="accent6"/>
+            </a:solidFill>
+          </a:ln>
+        </p:spPr>
+        <p:style>
+          <a:lnRef idx="2">
+            <a:schemeClr val="accent1">
+              <a:shade val="50000"/>
+            </a:schemeClr>
+          </a:lnRef>
+          <a:fillRef idx="1">
+            <a:schemeClr val="accent1"/>
+          </a:fillRef>
+          <a:effectRef idx="0">
+            <a:schemeClr val="accent1"/>
+          </a:effectRef>
+          <a:fontRef idx="minor">
+            <a:schemeClr val="lt1"/>
+          </a:fontRef>
+        </p:style>
+        <p:txBody>
+          <a:bodyPr rtlCol="0" anchor="ctr"/>
+          <a:lstStyle/>
+          <a:p>
+            <a:pPr algn="ctr"/>
+            <a:endParaRPr lang="en-CA"/>
+          </a:p>
+        </p:txBody>
+      </p:sp>
+    </p:spTree>
+    <p:extLst>
+      <p:ext uri="{BB962C8B-B14F-4D97-AF65-F5344CB8AC3E}">
+        <p14:creationId xmlns:p14="http://schemas.microsoft.com/office/powerpoint/2010/main" val="3395988439"/>
       </p:ext>
     </p:extLst>
   </p:cSld>

</xml_diff>